<commit_message>
corrections to a couple of PowerPoint slides
</commit_message>
<xml_diff>
--- a/PowerPoints/06 - Syntax Analysis.pptx
+++ b/PowerPoints/06 - Syntax Analysis.pptx
@@ -9658,8 +9658,16 @@
           <a:lstStyle/>
           <a:p>
             <a:r>
-              <a:rPr lang="en-US"/>
-              <a:t>©SoftMoore Consulting</a:t>
+              <a:rPr lang="en-US" dirty="0"/>
+              <a:t>©</a:t>
+            </a:r>
+            <a:r>
+              <a:rPr lang="en-US" dirty="0" err="1"/>
+              <a:t>SoftMoore</a:t>
+            </a:r>
+            <a:r>
+              <a:rPr lang="en-US" dirty="0"/>
+              <a:t> Consulting</a:t>
             </a:r>
           </a:p>
         </p:txBody>
@@ -14212,7 +14220,9 @@
               <a:buNone/>
             </a:pPr>
             <a:r>
-              <a:rPr lang="en-US" sz="1800" dirty="0"/>
+              <a:rPr lang="en-US" sz="1800" dirty="0">
+                <a:latin typeface="Consolas" panose="020B0609020204030204" pitchFamily="49" charset="0"/>
+              </a:rPr>
               <a:t>subprogramDecls = subprogramDecl { subprogramDecl } .</a:t>
             </a:r>
           </a:p>
@@ -23458,85 +23468,143 @@
             <p:ph idx="1"/>
           </p:nvPr>
         </p:nvSpPr>
-        <p:spPr/>
-        <p:txBody>
-          <a:bodyPr/>
-          <a:lstStyle/>
-          <a:p>
-            <a:r>
-              <a:rPr lang="en-US" dirty="0"/>
-              <a:t>As given, the grammar for CPRL is “not quite” LL(1)</a:t>
-            </a:r>
-          </a:p>
-          <a:p>
-            <a:r>
-              <a:rPr lang="en-US" dirty="0"/>
-              <a:t>Example: Parsing a statement.</a:t>
-            </a:r>
-          </a:p>
-          <a:p>
-            <a:pPr lvl="1">
-              <a:buNone/>
-            </a:pPr>
+        <p:spPr>
+          <a:xfrm>
+            <a:off x="458787" y="1363663"/>
+            <a:ext cx="8321040" cy="4935537"/>
+          </a:xfrm>
+        </p:spPr>
+        <p:txBody>
+          <a:bodyPr/>
+          <a:lstStyle/>
+          <a:p>
+            <a:pPr>
+              <a:spcBef>
+                <a:spcPts val="0"/>
+              </a:spcBef>
+            </a:pPr>
+            <a:r>
+              <a:rPr lang="en-US" sz="2350" dirty="0"/>
+              <a:t>As given, the grammar for CPRL is “not quite” LL(1).  Consider the rule for </a:t>
+            </a:r>
+            <a:r>
+              <a:rPr lang="en-US" sz="2350" dirty="0">
+                <a:latin typeface="Consolas" panose="020B0609020204030204" pitchFamily="49" charset="0"/>
+              </a:rPr>
+              <a:t>statement</a:t>
+            </a:r>
+            <a:r>
+              <a:rPr lang="en-US" sz="2350" dirty="0"/>
+              <a:t>.</a:t>
+            </a:r>
+            <a:br>
+              <a:rPr lang="en-US" sz="2350" dirty="0"/>
+            </a:br>
+            <a:r>
+              <a:rPr lang="en-US" dirty="0"/>
+              <a:t> </a:t>
+            </a:r>
             <a:r>
               <a:rPr lang="en-US" sz="1800" dirty="0">
                 <a:latin typeface="Consolas" pitchFamily="49" charset="0"/>
                 <a:cs typeface="Consolas" pitchFamily="49" charset="0"/>
               </a:rPr>
-              <a:t> statement = </a:t>
+              <a:t>statement = </a:t>
             </a:r>
             <a:r>
               <a:rPr lang="en-US" sz="1800" dirty="0" err="1">
                 <a:latin typeface="Consolas" pitchFamily="49" charset="0"/>
                 <a:cs typeface="Consolas" pitchFamily="49" charset="0"/>
               </a:rPr>
+              <a:t>assignmentStmt</a:t>
+            </a:r>
+            <a:r>
+              <a:rPr lang="en-US" sz="1800" dirty="0">
+                <a:latin typeface="Consolas" pitchFamily="49" charset="0"/>
+                <a:cs typeface="Consolas" pitchFamily="49" charset="0"/>
+              </a:rPr>
+              <a:t> | </a:t>
+            </a:r>
+            <a:r>
+              <a:rPr lang="en-US" sz="1800" dirty="0" err="1">
+                <a:latin typeface="Consolas" pitchFamily="49" charset="0"/>
+                <a:cs typeface="Consolas" pitchFamily="49" charset="0"/>
+              </a:rPr>
+              <a:t>procedureCallStmt</a:t>
+            </a:r>
+            <a:r>
+              <a:rPr lang="en-US" sz="1800" dirty="0">
+                <a:latin typeface="Consolas" pitchFamily="49" charset="0"/>
+                <a:cs typeface="Consolas" pitchFamily="49" charset="0"/>
+              </a:rPr>
+              <a:t> | </a:t>
+            </a:r>
+            <a:r>
+              <a:rPr lang="en-US" sz="1800" dirty="0" err="1">
+                <a:latin typeface="Consolas" pitchFamily="49" charset="0"/>
+                <a:cs typeface="Consolas" pitchFamily="49" charset="0"/>
+              </a:rPr>
               <a:t>compoundStmt</a:t>
             </a:r>
-            <a:r>
+            <a:br>
               <a:rPr lang="en-US" sz="1800" dirty="0">
                 <a:latin typeface="Consolas" pitchFamily="49" charset="0"/>
                 <a:cs typeface="Consolas" pitchFamily="49" charset="0"/>
               </a:rPr>
-              <a:t> | </a:t>
+            </a:br>
+            <a:r>
+              <a:rPr lang="en-US" sz="1800" dirty="0">
+                <a:latin typeface="Consolas" pitchFamily="49" charset="0"/>
+                <a:cs typeface="Consolas" pitchFamily="49" charset="0"/>
+              </a:rPr>
+              <a:t>           | </a:t>
             </a:r>
             <a:r>
               <a:rPr lang="en-US" sz="1800" dirty="0" err="1">
                 <a:latin typeface="Consolas" pitchFamily="49" charset="0"/>
                 <a:cs typeface="Consolas" pitchFamily="49" charset="0"/>
               </a:rPr>
-              <a:t>assignmentStmt</a:t>
+              <a:t>ifStmt</a:t>
             </a:r>
             <a:r>
               <a:rPr lang="en-US" sz="1800" dirty="0">
                 <a:latin typeface="Consolas" pitchFamily="49" charset="0"/>
                 <a:cs typeface="Consolas" pitchFamily="49" charset="0"/>
               </a:rPr>
-              <a:t> | </a:t>
+              <a:t>         | </a:t>
             </a:r>
             <a:r>
               <a:rPr lang="en-US" sz="1800" dirty="0" err="1">
                 <a:latin typeface="Consolas" pitchFamily="49" charset="0"/>
                 <a:cs typeface="Consolas" pitchFamily="49" charset="0"/>
               </a:rPr>
-              <a:t>ifStmt</a:t>
-            </a:r>
-            <a:endParaRPr lang="en-US" sz="1800" dirty="0">
-              <a:latin typeface="Consolas" pitchFamily="49" charset="0"/>
-              <a:cs typeface="Consolas" pitchFamily="49" charset="0"/>
-            </a:endParaRPr>
-          </a:p>
-          <a:p>
-            <a:pPr lvl="1">
-              <a:spcBef>
-                <a:spcPts val="200"/>
-              </a:spcBef>
-              <a:buNone/>
-            </a:pPr>
+              <a:t>loopStmt</a:t>
+            </a:r>
             <a:r>
               <a:rPr lang="en-US" sz="1800" dirty="0">
                 <a:latin typeface="Consolas" pitchFamily="49" charset="0"/>
                 <a:cs typeface="Consolas" pitchFamily="49" charset="0"/>
               </a:rPr>
+              <a:t>          | </a:t>
+            </a:r>
+            <a:r>
+              <a:rPr lang="en-US" sz="1800" dirty="0" err="1">
+                <a:latin typeface="Consolas" pitchFamily="49" charset="0"/>
+                <a:cs typeface="Consolas" pitchFamily="49" charset="0"/>
+              </a:rPr>
+              <a:t>forLoopStmt</a:t>
+            </a:r>
+            <a:br>
+              <a:rPr lang="en-US" sz="1800" dirty="0">
+                <a:latin typeface="Consolas" pitchFamily="49" charset="0"/>
+                <a:cs typeface="Consolas" pitchFamily="49" charset="0"/>
+              </a:rPr>
+            </a:br>
+            <a:r>
+              <a:rPr lang="en-US" sz="1800" dirty="0">
+                <a:latin typeface="Consolas" pitchFamily="49" charset="0"/>
+                <a:cs typeface="Consolas" pitchFamily="49" charset="0"/>
+              </a:rPr>
               <a:t>           | </a:t>
             </a:r>
             <a:r>
@@ -23544,109 +23612,75 @@
                 <a:latin typeface="Consolas" pitchFamily="49" charset="0"/>
                 <a:cs typeface="Consolas" pitchFamily="49" charset="0"/>
               </a:rPr>
-              <a:t>loopStmt</a:t>
+              <a:t>exitStmt</a:t>
             </a:r>
             <a:r>
               <a:rPr lang="en-US" sz="1800" dirty="0">
                 <a:latin typeface="Consolas" pitchFamily="49" charset="0"/>
                 <a:cs typeface="Consolas" pitchFamily="49" charset="0"/>
               </a:rPr>
-              <a:t> | </a:t>
+              <a:t>       | </a:t>
             </a:r>
             <a:r>
               <a:rPr lang="en-US" sz="1800" dirty="0" err="1">
                 <a:latin typeface="Consolas" pitchFamily="49" charset="0"/>
                 <a:cs typeface="Consolas" pitchFamily="49" charset="0"/>
               </a:rPr>
-              <a:t>exitStmt</a:t>
+              <a:t>readStmt</a:t>
             </a:r>
             <a:r>
               <a:rPr lang="en-US" sz="1800" dirty="0">
                 <a:latin typeface="Consolas" pitchFamily="49" charset="0"/>
                 <a:cs typeface="Consolas" pitchFamily="49" charset="0"/>
               </a:rPr>
-              <a:t> | </a:t>
+              <a:t>          | </a:t>
             </a:r>
             <a:r>
               <a:rPr lang="en-US" sz="1800" dirty="0" err="1">
                 <a:latin typeface="Consolas" pitchFamily="49" charset="0"/>
                 <a:cs typeface="Consolas" pitchFamily="49" charset="0"/>
               </a:rPr>
-              <a:t>readStmt</a:t>
-            </a:r>
-            <a:r>
+              <a:t>writeStmt</a:t>
+            </a:r>
+            <a:br>
               <a:rPr lang="en-US" sz="1800" dirty="0">
                 <a:latin typeface="Consolas" pitchFamily="49" charset="0"/>
                 <a:cs typeface="Consolas" pitchFamily="49" charset="0"/>
               </a:rPr>
-              <a:t> | </a:t>
+            </a:br>
+            <a:r>
+              <a:rPr lang="en-US" sz="1800" dirty="0">
+                <a:latin typeface="Consolas" pitchFamily="49" charset="0"/>
+                <a:cs typeface="Consolas" pitchFamily="49" charset="0"/>
+              </a:rPr>
+              <a:t>           | </a:t>
             </a:r>
             <a:r>
               <a:rPr lang="en-US" sz="1800" dirty="0" err="1">
                 <a:latin typeface="Consolas" pitchFamily="49" charset="0"/>
                 <a:cs typeface="Consolas" pitchFamily="49" charset="0"/>
               </a:rPr>
-              <a:t>writeStmt</a:t>
-            </a:r>
-            <a:endParaRPr lang="en-US" sz="1800" dirty="0">
-              <a:latin typeface="Consolas" pitchFamily="49" charset="0"/>
-              <a:cs typeface="Consolas" pitchFamily="49" charset="0"/>
-            </a:endParaRPr>
-          </a:p>
-          <a:p>
-            <a:pPr lvl="1">
-              <a:spcBef>
-                <a:spcPts val="200"/>
-              </a:spcBef>
-              <a:buNone/>
-            </a:pPr>
+              <a:t>writelnStmt</a:t>
+            </a:r>
             <a:r>
               <a:rPr lang="en-US" sz="1800" dirty="0">
                 <a:latin typeface="Consolas" pitchFamily="49" charset="0"/>
                 <a:cs typeface="Consolas" pitchFamily="49" charset="0"/>
               </a:rPr>
-              <a:t>           | </a:t>
+              <a:t>    | </a:t>
             </a:r>
             <a:r>
               <a:rPr lang="en-US" sz="1800" dirty="0" err="1">
                 <a:latin typeface="Consolas" pitchFamily="49" charset="0"/>
                 <a:cs typeface="Consolas" pitchFamily="49" charset="0"/>
               </a:rPr>
-              <a:t>writelnStmt</a:t>
+              <a:t>returnStmt</a:t>
             </a:r>
             <a:r>
               <a:rPr lang="en-US" sz="1800" dirty="0">
                 <a:latin typeface="Consolas" pitchFamily="49" charset="0"/>
                 <a:cs typeface="Consolas" pitchFamily="49" charset="0"/>
               </a:rPr>
-              <a:t> | </a:t>
-            </a:r>
-            <a:r>
-              <a:rPr lang="en-US" sz="1800" dirty="0" err="1">
-                <a:latin typeface="Consolas" pitchFamily="49" charset="0"/>
-                <a:cs typeface="Consolas" pitchFamily="49" charset="0"/>
-              </a:rPr>
-              <a:t>procedureCallStmt</a:t>
-            </a:r>
-            <a:r>
-              <a:rPr lang="en-US" sz="1800" dirty="0">
-                <a:latin typeface="Consolas" pitchFamily="49" charset="0"/>
-                <a:cs typeface="Consolas" pitchFamily="49" charset="0"/>
-              </a:rPr>
-              <a:t> | </a:t>
-            </a:r>
-            <a:r>
-              <a:rPr lang="en-US" sz="1800" dirty="0" err="1">
-                <a:latin typeface="Consolas" pitchFamily="49" charset="0"/>
-                <a:cs typeface="Consolas" pitchFamily="49" charset="0"/>
-              </a:rPr>
-              <a:t>returnStmt</a:t>
-            </a:r>
-            <a:r>
-              <a:rPr lang="en-US" sz="1800" dirty="0">
-                <a:latin typeface="Consolas" pitchFamily="49" charset="0"/>
-                <a:cs typeface="Consolas" pitchFamily="49" charset="0"/>
-              </a:rPr>
               <a:t> .</a:t>
             </a:r>
           </a:p>
@@ -23657,36 +23691,36 @@
               </a:spcBef>
             </a:pPr>
             <a:r>
-              <a:rPr lang="en-US" dirty="0"/>
+              <a:rPr lang="en-US" sz="2350" dirty="0"/>
               <a:t>Use the </a:t>
             </a:r>
             <a:r>
-              <a:rPr lang="en-US" dirty="0" err="1"/>
+              <a:rPr lang="en-US" sz="2350" dirty="0" err="1"/>
               <a:t>lookahead</a:t>
             </a:r>
             <a:r>
-              <a:rPr lang="en-US" dirty="0"/>
+              <a:rPr lang="en-US" sz="2350" dirty="0"/>
               <a:t> symbol to select the parsing method.</a:t>
             </a:r>
           </a:p>
           <a:p>
             <a:pPr lvl="1"/>
             <a:r>
-              <a:rPr lang="en-US" dirty="0"/>
+              <a:rPr lang="en-US" sz="1900" dirty="0"/>
               <a:t>“</a:t>
             </a:r>
             <a:r>
-              <a:rPr lang="en-US" dirty="0">
+              <a:rPr lang="en-US" sz="1900" dirty="0">
                 <a:latin typeface="Consolas" panose="020B0609020204030204" pitchFamily="49" charset="0"/>
               </a:rPr>
               <a:t>if</a:t>
             </a:r>
             <a:r>
-              <a:rPr lang="en-US" dirty="0"/>
+              <a:rPr lang="en-US" sz="1900" dirty="0"/>
               <a:t>”	→  call </a:t>
             </a:r>
             <a:r>
-              <a:rPr lang="en-US" dirty="0">
+              <a:rPr lang="en-US" sz="1900" dirty="0">
                 <a:latin typeface="Consolas" panose="020B0609020204030204" pitchFamily="49" charset="0"/>
               </a:rPr>
               <a:t>parseIfStmt()</a:t>
@@ -23695,104 +23729,104 @@
           <a:p>
             <a:pPr lvl="1"/>
             <a:r>
-              <a:rPr lang="en-US" dirty="0"/>
+              <a:rPr lang="en-US" sz="1900" dirty="0"/>
               <a:t>“</a:t>
             </a:r>
             <a:r>
-              <a:rPr lang="en-US" dirty="0">
+              <a:rPr lang="en-US" sz="1900" dirty="0">
                 <a:latin typeface="Consolas" panose="020B0609020204030204" pitchFamily="49" charset="0"/>
               </a:rPr>
               <a:t>while</a:t>
             </a:r>
             <a:r>
-              <a:rPr lang="en-US" dirty="0"/>
+              <a:rPr lang="en-US" sz="1900" dirty="0"/>
               <a:t>”	→  call </a:t>
             </a:r>
             <a:r>
-              <a:rPr lang="en-US" dirty="0">
+              <a:rPr lang="en-US" sz="1900" dirty="0">
                 <a:latin typeface="Consolas" panose="020B0609020204030204" pitchFamily="49" charset="0"/>
               </a:rPr>
               <a:t>parseLoopStmt()</a:t>
             </a:r>
-            <a:endParaRPr lang="en-US" dirty="0"/>
+            <a:endParaRPr lang="en-US" sz="1900" dirty="0"/>
           </a:p>
           <a:p>
             <a:pPr lvl="1"/>
             <a:r>
-              <a:rPr lang="en-US" dirty="0"/>
+              <a:rPr lang="en-US" sz="1900" dirty="0"/>
               <a:t>“</a:t>
             </a:r>
             <a:r>
-              <a:rPr lang="en-US" dirty="0">
+              <a:rPr lang="en-US" sz="1900" dirty="0">
                 <a:latin typeface="Consolas" panose="020B0609020204030204" pitchFamily="49" charset="0"/>
               </a:rPr>
               <a:t>loop</a:t>
             </a:r>
             <a:r>
-              <a:rPr lang="en-US" dirty="0"/>
+              <a:rPr lang="en-US" sz="1900" dirty="0"/>
               <a:t>” 	→  call </a:t>
             </a:r>
             <a:r>
-              <a:rPr lang="en-US" dirty="0">
+              <a:rPr lang="en-US" sz="1900" dirty="0">
                 <a:latin typeface="Consolas" panose="020B0609020204030204" pitchFamily="49" charset="0"/>
               </a:rPr>
               <a:t>parseLoopStmt()</a:t>
             </a:r>
-            <a:endParaRPr lang="en-US" dirty="0"/>
+            <a:endParaRPr lang="en-US" sz="1900" dirty="0"/>
           </a:p>
           <a:p>
             <a:pPr lvl="1"/>
             <a:r>
-              <a:rPr lang="en-US" dirty="0"/>
+              <a:rPr lang="en-US" sz="1900" dirty="0"/>
               <a:t>identifier 	→  call either </a:t>
             </a:r>
             <a:r>
-              <a:rPr lang="en-US" dirty="0">
+              <a:rPr lang="en-US" sz="1900" dirty="0">
                 <a:latin typeface="Consolas" panose="020B0609020204030204" pitchFamily="49" charset="0"/>
               </a:rPr>
               <a:t>parseAssignmentStmt()</a:t>
             </a:r>
             <a:r>
-              <a:rPr lang="en-US" dirty="0"/>
+              <a:rPr lang="en-US" sz="1900" dirty="0"/>
               <a:t> or</a:t>
             </a:r>
             <a:br>
-              <a:rPr lang="en-US" dirty="0"/>
+              <a:rPr lang="en-US" sz="1900" dirty="0"/>
             </a:br>
             <a:r>
-              <a:rPr lang="en-US" dirty="0"/>
+              <a:rPr lang="en-US" sz="1900" dirty="0"/>
               <a:t>		      </a:t>
             </a:r>
             <a:r>
-              <a:rPr lang="en-US" dirty="0" err="1">
+              <a:rPr lang="en-US" sz="1900" dirty="0" err="1">
                 <a:latin typeface="Consolas" panose="020B0609020204030204" pitchFamily="49" charset="0"/>
               </a:rPr>
               <a:t>parseProcedureCallStmt</a:t>
             </a:r>
             <a:r>
-              <a:rPr lang="en-US" dirty="0">
+              <a:rPr lang="en-US" sz="1900" dirty="0">
                 <a:latin typeface="Consolas" panose="020B0609020204030204" pitchFamily="49" charset="0"/>
               </a:rPr>
               <a:t>()</a:t>
             </a:r>
             <a:r>
-              <a:rPr lang="en-US" dirty="0"/>
+              <a:rPr lang="en-US" sz="1900" dirty="0"/>
               <a:t>  (which one?)</a:t>
             </a:r>
           </a:p>
           <a:p>
             <a:r>
-              <a:rPr lang="en-US" dirty="0"/>
+              <a:rPr lang="en-US" sz="2350" dirty="0"/>
               <a:t>Symbol </a:t>
             </a:r>
             <a:r>
-              <a:rPr lang="en-US" dirty="0">
+              <a:rPr lang="en-US" sz="2350" dirty="0">
                 <a:latin typeface="Consolas" panose="020B0609020204030204" pitchFamily="49" charset="0"/>
               </a:rPr>
               <a:t>identifier</a:t>
             </a:r>
             <a:r>
-              <a:rPr lang="en-US" dirty="0"/>
+              <a:rPr lang="en-US" sz="2350" dirty="0"/>
               <a:t> is in the first set of both an assignment statement and a procedure call statement.</a:t>
             </a:r>
           </a:p>

</xml_diff>

<commit_message>
updated one slide to conform to other recent changes
</commit_message>
<xml_diff>
--- a/PowerPoints/06 - Syntax Analysis.pptx
+++ b/PowerPoints/06 - Syntax Analysis.pptx
@@ -14223,7 +14223,19 @@
               <a:rPr lang="en-US" sz="1800" dirty="0">
                 <a:latin typeface="Consolas" panose="020B0609020204030204" pitchFamily="49" charset="0"/>
               </a:rPr>
-              <a:t>subprogramDecls = subprogramDecl { subprogramDecl } .</a:t>
+              <a:t>subprogramDecls </a:t>
+            </a:r>
+            <a:r>
+              <a:rPr lang="en-US" sz="1800">
+                <a:latin typeface="Consolas" panose="020B0609020204030204" pitchFamily="49" charset="0"/>
+              </a:rPr>
+              <a:t>= { </a:t>
+            </a:r>
+            <a:r>
+              <a:rPr lang="en-US" sz="1800" dirty="0">
+                <a:latin typeface="Consolas" panose="020B0609020204030204" pitchFamily="49" charset="0"/>
+              </a:rPr>
+              <a:t>subprogramDecl } .</a:t>
             </a:r>
           </a:p>
           <a:p>

</xml_diff>

<commit_message>
added content to one PowerPoint slide
</commit_message>
<xml_diff>
--- a/PowerPoints/06 - Syntax Analysis.pptx
+++ b/PowerPoints/06 - Syntax Analysis.pptx
@@ -90,7 +90,7 @@
     <p:sldId id="399" r:id="rId78"/>
   </p:sldIdLst>
   <p:sldSz cx="9144000" cy="6858000" type="screen4x3"/>
-  <p:notesSz cx="7010400" cy="9296400"/>
+  <p:notesSz cx="7315200" cy="9601200"/>
   <p:defaultTextStyle>
     <a:defPPr>
       <a:defRPr lang="en-US"/>
@@ -233,12 +233,12 @@
     </p:ext>
     <p:ext uri="{2D200454-40CA-4A62-9FC3-DE9A4176ACB9}">
       <p15:notesGuideLst xmlns:p15="http://schemas.microsoft.com/office/powerpoint/2012/main">
-        <p15:guide id="1" orient="horz" pos="2928" userDrawn="1">
+        <p15:guide id="1" orient="horz" pos="3024" userDrawn="1">
           <p15:clr>
             <a:srgbClr val="A4A3A4"/>
           </p15:clr>
         </p15:guide>
-        <p15:guide id="2" pos="2208" userDrawn="1">
+        <p15:guide id="2" pos="2304" userDrawn="1">
           <p15:clr>
             <a:srgbClr val="A4A3A4"/>
           </p15:clr>
@@ -286,8 +286,8 @@
         </p:nvSpPr>
         <p:spPr bwMode="auto">
           <a:xfrm>
-            <a:off x="3971927" y="0"/>
-            <a:ext cx="3038475" cy="465138"/>
+            <a:off x="4144620" y="0"/>
+            <a:ext cx="3170583" cy="480388"/>
           </a:xfrm>
           <a:prstGeom prst="rect">
             <a:avLst/>
@@ -302,13 +302,13 @@
           <a:effectLst/>
         </p:spPr>
         <p:txBody>
-          <a:bodyPr vert="horz" wrap="square" lIns="93164" tIns="46582" rIns="93164" bIns="46582" numCol="1" anchor="t" anchorCtr="0" compatLnSpc="1">
+          <a:bodyPr vert="horz" wrap="square" lIns="96639" tIns="48320" rIns="96639" bIns="48320" numCol="1" anchor="t" anchorCtr="0" compatLnSpc="1">
             <a:prstTxWarp prst="textNoShape">
               <a:avLst/>
             </a:prstTxWarp>
           </a:bodyPr>
           <a:lstStyle>
-            <a:lvl1pPr algn="r" defTabSz="931726">
+            <a:lvl1pPr algn="r" defTabSz="966479">
               <a:defRPr sz="1200" smtClean="0"/>
             </a:lvl1pPr>
           </a:lstStyle>
@@ -337,8 +337,8 @@
         </p:nvSpPr>
         <p:spPr bwMode="auto">
           <a:xfrm>
-            <a:off x="3971927" y="8831265"/>
-            <a:ext cx="3038475" cy="465137"/>
+            <a:off x="4144620" y="9120815"/>
+            <a:ext cx="3170583" cy="480387"/>
           </a:xfrm>
           <a:prstGeom prst="rect">
             <a:avLst/>
@@ -353,13 +353,13 @@
           <a:effectLst/>
         </p:spPr>
         <p:txBody>
-          <a:bodyPr vert="horz" wrap="square" lIns="93164" tIns="46582" rIns="93164" bIns="46582" numCol="1" anchor="b" anchorCtr="0" compatLnSpc="1">
+          <a:bodyPr vert="horz" wrap="square" lIns="96639" tIns="48320" rIns="96639" bIns="48320" numCol="1" anchor="b" anchorCtr="0" compatLnSpc="1">
             <a:prstTxWarp prst="textNoShape">
               <a:avLst/>
             </a:prstTxWarp>
           </a:bodyPr>
           <a:lstStyle>
-            <a:lvl1pPr algn="r" defTabSz="931726">
+            <a:lvl1pPr algn="r" defTabSz="966479">
               <a:defRPr sz="1200" smtClean="0"/>
             </a:lvl1pPr>
           </a:lstStyle>
@@ -437,7 +437,7 @@
         <p:spPr bwMode="auto">
           <a:xfrm>
             <a:off x="2" y="0"/>
-            <a:ext cx="3038475" cy="465138"/>
+            <a:ext cx="3170583" cy="480388"/>
           </a:xfrm>
           <a:prstGeom prst="rect">
             <a:avLst/>
@@ -452,13 +452,13 @@
           <a:effectLst/>
         </p:spPr>
         <p:txBody>
-          <a:bodyPr vert="horz" wrap="square" lIns="93164" tIns="46582" rIns="93164" bIns="46582" numCol="1" anchor="t" anchorCtr="0" compatLnSpc="1">
+          <a:bodyPr vert="horz" wrap="square" lIns="96639" tIns="48320" rIns="96639" bIns="48320" numCol="1" anchor="t" anchorCtr="0" compatLnSpc="1">
             <a:prstTxWarp prst="textNoShape">
               <a:avLst/>
             </a:prstTxWarp>
           </a:bodyPr>
           <a:lstStyle>
-            <a:lvl1pPr algn="l" defTabSz="931726">
+            <a:lvl1pPr algn="l" defTabSz="966479">
               <a:defRPr sz="1200" smtClean="0"/>
             </a:lvl1pPr>
           </a:lstStyle>
@@ -485,8 +485,8 @@
         </p:nvSpPr>
         <p:spPr bwMode="auto">
           <a:xfrm>
-            <a:off x="3971927" y="0"/>
-            <a:ext cx="3038475" cy="465138"/>
+            <a:off x="4144620" y="0"/>
+            <a:ext cx="3170583" cy="480388"/>
           </a:xfrm>
           <a:prstGeom prst="rect">
             <a:avLst/>
@@ -501,13 +501,13 @@
           <a:effectLst/>
         </p:spPr>
         <p:txBody>
-          <a:bodyPr vert="horz" wrap="square" lIns="93164" tIns="46582" rIns="93164" bIns="46582" numCol="1" anchor="t" anchorCtr="0" compatLnSpc="1">
+          <a:bodyPr vert="horz" wrap="square" lIns="96639" tIns="48320" rIns="96639" bIns="48320" numCol="1" anchor="t" anchorCtr="0" compatLnSpc="1">
             <a:prstTxWarp prst="textNoShape">
               <a:avLst/>
             </a:prstTxWarp>
           </a:bodyPr>
           <a:lstStyle>
-            <a:lvl1pPr algn="r" defTabSz="931726">
+            <a:lvl1pPr algn="r" defTabSz="966479">
               <a:defRPr sz="1200" smtClean="0"/>
             </a:lvl1pPr>
           </a:lstStyle>
@@ -531,8 +531,8 @@
         </p:nvSpPr>
         <p:spPr bwMode="auto">
           <a:xfrm>
-            <a:off x="1181100" y="696913"/>
-            <a:ext cx="4648200" cy="3486150"/>
+            <a:off x="1257300" y="719138"/>
+            <a:ext cx="4800600" cy="3600450"/>
           </a:xfrm>
           <a:prstGeom prst="rect">
             <a:avLst/>
@@ -560,8 +560,8 @@
         </p:nvSpPr>
         <p:spPr bwMode="auto">
           <a:xfrm>
-            <a:off x="935040" y="4416427"/>
-            <a:ext cx="5140325" cy="4183063"/>
+            <a:off x="975695" y="4561228"/>
+            <a:ext cx="5363817" cy="4320213"/>
           </a:xfrm>
           <a:prstGeom prst="rect">
             <a:avLst/>
@@ -576,7 +576,7 @@
           <a:effectLst/>
         </p:spPr>
         <p:txBody>
-          <a:bodyPr vert="horz" wrap="square" lIns="93164" tIns="46582" rIns="93164" bIns="46582" numCol="1" anchor="t" anchorCtr="0" compatLnSpc="1">
+          <a:bodyPr vert="horz" wrap="square" lIns="96639" tIns="48320" rIns="96639" bIns="48320" numCol="1" anchor="t" anchorCtr="0" compatLnSpc="1">
             <a:prstTxWarp prst="textNoShape">
               <a:avLst/>
             </a:prstTxWarp>
@@ -631,8 +631,8 @@
         </p:nvSpPr>
         <p:spPr bwMode="auto">
           <a:xfrm>
-            <a:off x="2" y="8831265"/>
-            <a:ext cx="3038475" cy="465137"/>
+            <a:off x="2" y="9120815"/>
+            <a:ext cx="3170583" cy="480387"/>
           </a:xfrm>
           <a:prstGeom prst="rect">
             <a:avLst/>
@@ -647,13 +647,13 @@
           <a:effectLst/>
         </p:spPr>
         <p:txBody>
-          <a:bodyPr vert="horz" wrap="square" lIns="93164" tIns="46582" rIns="93164" bIns="46582" numCol="1" anchor="b" anchorCtr="0" compatLnSpc="1">
+          <a:bodyPr vert="horz" wrap="square" lIns="96639" tIns="48320" rIns="96639" bIns="48320" numCol="1" anchor="b" anchorCtr="0" compatLnSpc="1">
             <a:prstTxWarp prst="textNoShape">
               <a:avLst/>
             </a:prstTxWarp>
           </a:bodyPr>
           <a:lstStyle>
-            <a:lvl1pPr algn="l" defTabSz="931726">
+            <a:lvl1pPr algn="l" defTabSz="966479">
               <a:defRPr sz="1200" smtClean="0"/>
             </a:lvl1pPr>
           </a:lstStyle>
@@ -677,8 +677,8 @@
         </p:nvSpPr>
         <p:spPr bwMode="auto">
           <a:xfrm>
-            <a:off x="3971927" y="8831265"/>
-            <a:ext cx="3038475" cy="465137"/>
+            <a:off x="4144620" y="9120815"/>
+            <a:ext cx="3170583" cy="480387"/>
           </a:xfrm>
           <a:prstGeom prst="rect">
             <a:avLst/>
@@ -693,13 +693,13 @@
           <a:effectLst/>
         </p:spPr>
         <p:txBody>
-          <a:bodyPr vert="horz" wrap="square" lIns="93164" tIns="46582" rIns="93164" bIns="46582" numCol="1" anchor="b" anchorCtr="0" compatLnSpc="1">
+          <a:bodyPr vert="horz" wrap="square" lIns="96639" tIns="48320" rIns="96639" bIns="48320" numCol="1" anchor="b" anchorCtr="0" compatLnSpc="1">
             <a:prstTxWarp prst="textNoShape">
               <a:avLst/>
             </a:prstTxWarp>
           </a:bodyPr>
           <a:lstStyle>
-            <a:lvl1pPr algn="r" defTabSz="931726">
+            <a:lvl1pPr algn="r" defTabSz="966479">
               <a:defRPr sz="1200" smtClean="0"/>
             </a:lvl1pPr>
           </a:lstStyle>
@@ -5559,7 +5559,7 @@
           <a:bodyPr/>
           <a:lstStyle/>
           <a:p>
-            <a:pPr defTabSz="930138"/>
+            <a:pPr defTabSz="964832"/>
             <a:r>
               <a:rPr lang="en-US"/>
               <a:t>Subprograms</a:t>
@@ -5584,10 +5584,10 @@
           <a:bodyPr/>
           <a:lstStyle/>
           <a:p>
-            <a:pPr defTabSz="930138"/>
+            <a:pPr defTabSz="964832"/>
             <a:fld id="{F7624EB1-F083-4E77-9F78-569C6646FEF6}" type="slidenum">
               <a:rPr lang="en-US" smtClean="0"/>
-              <a:pPr defTabSz="930138"/>
+              <a:pPr defTabSz="964832"/>
               <a:t>53</a:t>
             </a:fld>
             <a:endParaRPr lang="en-US"/>
@@ -5677,7 +5677,7 @@
           <a:bodyPr/>
           <a:lstStyle/>
           <a:p>
-            <a:pPr defTabSz="930138"/>
+            <a:pPr defTabSz="964832"/>
             <a:r>
               <a:rPr lang="en-US"/>
               <a:t>Subprograms</a:t>
@@ -5702,10 +5702,10 @@
           <a:bodyPr/>
           <a:lstStyle/>
           <a:p>
-            <a:pPr defTabSz="930138"/>
+            <a:pPr defTabSz="964832"/>
             <a:fld id="{F7624EB1-F083-4E77-9F78-569C6646FEF6}" type="slidenum">
               <a:rPr lang="en-US" smtClean="0"/>
-              <a:pPr defTabSz="930138"/>
+              <a:pPr defTabSz="964832"/>
               <a:t>54</a:t>
             </a:fld>
             <a:endParaRPr lang="en-US"/>
@@ -5910,7 +5910,7 @@
           <a:bodyPr/>
           <a:lstStyle/>
           <a:p>
-            <a:pPr defTabSz="930138"/>
+            <a:pPr defTabSz="964832"/>
             <a:r>
               <a:rPr lang="en-US"/>
               <a:t>Subprograms</a:t>
@@ -5935,10 +5935,10 @@
           <a:bodyPr/>
           <a:lstStyle/>
           <a:p>
-            <a:pPr defTabSz="930138"/>
+            <a:pPr defTabSz="964832"/>
             <a:fld id="{D92411FA-7305-4EA7-A40B-F5D90476B901}" type="slidenum">
               <a:rPr lang="en-US" smtClean="0"/>
-              <a:pPr defTabSz="930138"/>
+              <a:pPr defTabSz="964832"/>
               <a:t>57</a:t>
             </a:fld>
             <a:endParaRPr lang="en-US"/>
@@ -6028,7 +6028,7 @@
           <a:bodyPr/>
           <a:lstStyle/>
           <a:p>
-            <a:pPr defTabSz="930138"/>
+            <a:pPr defTabSz="964832"/>
             <a:r>
               <a:rPr lang="en-US"/>
               <a:t>Subprograms</a:t>
@@ -6053,10 +6053,10 @@
           <a:bodyPr/>
           <a:lstStyle/>
           <a:p>
-            <a:pPr defTabSz="930138"/>
+            <a:pPr defTabSz="964832"/>
             <a:fld id="{D92411FA-7305-4EA7-A40B-F5D90476B901}" type="slidenum">
               <a:rPr lang="en-US" smtClean="0"/>
-              <a:pPr defTabSz="930138"/>
+              <a:pPr defTabSz="964832"/>
               <a:t>58</a:t>
             </a:fld>
             <a:endParaRPr lang="en-US"/>
@@ -6380,7 +6380,7 @@
           <a:bodyPr/>
           <a:lstStyle/>
           <a:p>
-            <a:pPr defTabSz="930138"/>
+            <a:pPr defTabSz="964832"/>
             <a:r>
               <a:rPr lang="en-US"/>
               <a:t>Subprograms</a:t>
@@ -6405,10 +6405,10 @@
           <a:bodyPr/>
           <a:lstStyle/>
           <a:p>
-            <a:pPr defTabSz="930138"/>
+            <a:pPr defTabSz="964832"/>
             <a:fld id="{E4963487-933C-4DBA-A7C2-D88BC4B3A77E}" type="slidenum">
               <a:rPr lang="en-US" smtClean="0"/>
-              <a:pPr defTabSz="930138"/>
+              <a:pPr defTabSz="964832"/>
               <a:t>60</a:t>
             </a:fld>
             <a:endParaRPr lang="en-US"/>
@@ -6498,7 +6498,7 @@
           <a:bodyPr/>
           <a:lstStyle/>
           <a:p>
-            <a:pPr defTabSz="930138"/>
+            <a:pPr defTabSz="964832"/>
             <a:r>
               <a:rPr lang="en-US"/>
               <a:t>Subprograms</a:t>
@@ -6523,10 +6523,10 @@
           <a:bodyPr/>
           <a:lstStyle/>
           <a:p>
-            <a:pPr defTabSz="930138"/>
+            <a:pPr defTabSz="964832"/>
             <a:fld id="{E4963487-933C-4DBA-A7C2-D88BC4B3A77E}" type="slidenum">
               <a:rPr lang="en-US" smtClean="0"/>
-              <a:pPr defTabSz="930138"/>
+              <a:pPr defTabSz="964832"/>
               <a:t>61</a:t>
             </a:fld>
             <a:endParaRPr lang="en-US"/>
@@ -6616,7 +6616,7 @@
           <a:bodyPr/>
           <a:lstStyle/>
           <a:p>
-            <a:pPr defTabSz="930138"/>
+            <a:pPr defTabSz="964832"/>
             <a:r>
               <a:rPr lang="en-US"/>
               <a:t>Subprograms</a:t>
@@ -6641,10 +6641,10 @@
           <a:bodyPr/>
           <a:lstStyle/>
           <a:p>
-            <a:pPr defTabSz="930138"/>
+            <a:pPr defTabSz="964832"/>
             <a:fld id="{E4963487-933C-4DBA-A7C2-D88BC4B3A77E}" type="slidenum">
               <a:rPr lang="en-US" smtClean="0"/>
-              <a:pPr defTabSz="930138"/>
+              <a:pPr defTabSz="964832"/>
               <a:t>62</a:t>
             </a:fld>
             <a:endParaRPr lang="en-US"/>
@@ -14223,19 +14223,7 @@
               <a:rPr lang="en-US" sz="1800" dirty="0">
                 <a:latin typeface="Consolas" panose="020B0609020204030204" pitchFamily="49" charset="0"/>
               </a:rPr>
-              <a:t>subprogramDecls </a:t>
-            </a:r>
-            <a:r>
-              <a:rPr lang="en-US" sz="1800">
-                <a:latin typeface="Consolas" panose="020B0609020204030204" pitchFamily="49" charset="0"/>
-              </a:rPr>
-              <a:t>= { </a:t>
-            </a:r>
-            <a:r>
-              <a:rPr lang="en-US" sz="1800" dirty="0">
-                <a:latin typeface="Consolas" panose="020B0609020204030204" pitchFamily="49" charset="0"/>
-              </a:rPr>
-              <a:t>subprogramDecl } .</a:t>
+              <a:t>subprogramDecls = { subprogramDecl } .</a:t>
             </a:r>
           </a:p>
           <a:p>
@@ -26313,7 +26301,7 @@
               <a:t>Class </a:t>
             </a:r>
             <a:r>
-              <a:rPr lang="en-US" dirty="0" err="1">
+              <a:rPr lang="en-US" dirty="0">
                 <a:latin typeface="Consolas" pitchFamily="49" charset="0"/>
                 <a:cs typeface="Consolas" pitchFamily="49" charset="0"/>
               </a:rPr>
@@ -26356,7 +26344,7 @@
               <a:t>We will create a preliminary version class </a:t>
             </a:r>
             <a:r>
-              <a:rPr lang="en-US" dirty="0" err="1">
+              <a:rPr lang="en-US" dirty="0">
                 <a:latin typeface="Consolas" pitchFamily="49" charset="0"/>
               </a:rPr>
               <a:t>IdTable</a:t>
@@ -26568,7 +26556,7 @@
               <a:t>Class </a:t>
             </a:r>
             <a:r>
-              <a:rPr lang="en-US" dirty="0" err="1">
+              <a:rPr lang="en-US" dirty="0">
                 <a:latin typeface="Consolas" pitchFamily="49" charset="0"/>
                 <a:cs typeface="Consolas" pitchFamily="49" charset="0"/>
               </a:rPr>
@@ -26782,16 +26770,12 @@
               <a:t>Handling Scopes within Class </a:t>
             </a:r>
             <a:r>
-              <a:rPr lang="en-US" dirty="0" err="1">
+              <a:rPr lang="en-US" dirty="0">
                 <a:latin typeface="Consolas" pitchFamily="49" charset="0"/>
                 <a:cs typeface="Consolas" pitchFamily="49" charset="0"/>
               </a:rPr>
               <a:t>IdTable</a:t>
             </a:r>
-            <a:endParaRPr lang="en-US" dirty="0">
-              <a:latin typeface="Consolas" pitchFamily="49" charset="0"/>
-              <a:cs typeface="Consolas" pitchFamily="49" charset="0"/>
-            </a:endParaRPr>
           </a:p>
         </p:txBody>
       </p:sp>
@@ -26815,7 +26799,7 @@
               <a:t>Class </a:t>
             </a:r>
             <a:r>
-              <a:rPr lang="en-US" dirty="0" err="1">
+              <a:rPr lang="en-US" dirty="0">
                 <a:latin typeface="Consolas" panose="020B0609020204030204" pitchFamily="49" charset="0"/>
               </a:rPr>
               <a:t>IdTable</a:t>
@@ -27102,7 +27086,7 @@
               <a:t>Handling Scopes within Class </a:t>
             </a:r>
             <a:r>
-              <a:rPr lang="en-US" dirty="0" err="1">
+              <a:rPr lang="en-US" dirty="0">
                 <a:latin typeface="Consolas" pitchFamily="49" charset="0"/>
                 <a:cs typeface="Consolas" pitchFamily="49" charset="0"/>
               </a:rPr>
@@ -27473,7 +27457,7 @@
               <a:t>Handling Scopes within Class </a:t>
             </a:r>
             <a:r>
-              <a:rPr lang="en-US" dirty="0" err="1">
+              <a:rPr lang="en-US" dirty="0">
                 <a:latin typeface="Consolas" pitchFamily="49" charset="0"/>
                 <a:cs typeface="Consolas" pitchFamily="49" charset="0"/>
               </a:rPr>
@@ -27515,39 +27499,89 @@
               <a:t>Class </a:t>
             </a:r>
             <a:r>
+              <a:rPr lang="en-US" dirty="0">
+                <a:latin typeface="Consolas" panose="020B0609020204030204" pitchFamily="49" charset="0"/>
+              </a:rPr>
+              <a:t>IdTable</a:t>
+            </a:r>
+            <a:r>
+              <a:rPr lang="en-US" dirty="0"/>
+              <a:t>: implemented as a stack of scopes (i.e., a stack of maps).</a:t>
+            </a:r>
+          </a:p>
+          <a:p>
+            <a:pPr lvl="1"/>
+            <a:r>
+              <a:rPr lang="en-US" dirty="0"/>
+              <a:t>“Opening” a scope creates a new scope object that is pushed onto the stack.</a:t>
+            </a:r>
+          </a:p>
+          <a:p>
+            <a:pPr lvl="1"/>
+            <a:r>
+              <a:rPr lang="en-US" dirty="0"/>
+              <a:t>Searching for an entity involves searching within the current scope (top scope in the stack) and then, if necessary, within enclosing scopes (scopes under the top).</a:t>
+            </a:r>
+          </a:p>
+          <a:p>
+            <a:pPr lvl="1"/>
+            <a:r>
+              <a:rPr lang="en-US" dirty="0"/>
+              <a:t>Key methods</a:t>
+            </a:r>
+          </a:p>
+          <a:p>
+            <a:pPr marL="914400" lvl="2" indent="0">
+              <a:buNone/>
+            </a:pPr>
+            <a:r>
+              <a:rPr lang="en-US" dirty="0">
+                <a:latin typeface="Consolas" panose="020B0609020204030204" pitchFamily="49" charset="0"/>
+              </a:rPr>
+              <a:t>public void </a:t>
+            </a:r>
+            <a:r>
               <a:rPr lang="en-US" dirty="0" err="1">
                 <a:latin typeface="Consolas" panose="020B0609020204030204" pitchFamily="49" charset="0"/>
               </a:rPr>
-              <a:t>IdTable</a:t>
-            </a:r>
-            <a:r>
-              <a:rPr lang="en-US" dirty="0"/>
-              <a:t>: implemented as a stack of scopes (i.e., a stack of maps).</a:t>
-            </a:r>
-          </a:p>
-          <a:p>
-            <a:pPr lvl="1"/>
-            <a:r>
-              <a:rPr lang="en-US" dirty="0"/>
-              <a:t>“Opening” a scope creates a new scope object that is pushed onto the stack.</a:t>
-            </a:r>
-          </a:p>
-          <a:p>
-            <a:pPr lvl="1"/>
-            <a:r>
-              <a:rPr lang="en-US" dirty="0"/>
-              <a:t>Searching for an entity involves searching within the current scope (top scope in the stack) and then, if necessary, within enclosing scopes (scopes under the top).</a:t>
-            </a:r>
-          </a:p>
-          <a:p>
-            <a:pPr lvl="1"/>
-            <a:r>
-              <a:rPr lang="en-US" dirty="0"/>
-              <a:t>Key methods</a:t>
+              <a:t>openScope</a:t>
+            </a:r>
+            <a:r>
+              <a:rPr lang="en-US" dirty="0">
+                <a:latin typeface="Consolas" panose="020B0609020204030204" pitchFamily="49" charset="0"/>
+              </a:rPr>
+              <a:t>(</a:t>
+            </a:r>
+            <a:r>
+              <a:rPr lang="en-US" dirty="0" err="1">
+                <a:latin typeface="Consolas" panose="020B0609020204030204" pitchFamily="49" charset="0"/>
+              </a:rPr>
+              <a:t>ScopeLevel</a:t>
+            </a:r>
+            <a:r>
+              <a:rPr lang="en-US" dirty="0">
+                <a:latin typeface="Consolas" panose="020B0609020204030204" pitchFamily="49" charset="0"/>
+              </a:rPr>
+              <a:t> </a:t>
+            </a:r>
+            <a:r>
+              <a:rPr lang="en-US" dirty="0" err="1">
+                <a:latin typeface="Consolas" panose="020B0609020204030204" pitchFamily="49" charset="0"/>
+              </a:rPr>
+              <a:t>scopeLevel</a:t>
+            </a:r>
+            <a:r>
+              <a:rPr lang="en-US" dirty="0">
+                <a:latin typeface="Consolas" panose="020B0609020204030204" pitchFamily="49" charset="0"/>
+              </a:rPr>
+              <a:t>)</a:t>
             </a:r>
           </a:p>
           <a:p>
             <a:pPr marL="914400" lvl="2" indent="0">
+              <a:spcBef>
+                <a:spcPts val="300"/>
+              </a:spcBef>
               <a:buNone/>
             </a:pPr>
             <a:r>
@@ -27560,89 +27594,51 @@
               <a:rPr lang="en-US" dirty="0" err="1">
                 <a:latin typeface="Consolas" panose="020B0609020204030204" pitchFamily="49" charset="0"/>
               </a:rPr>
-              <a:t>openScope</a:t>
+              <a:t>closeScope</a:t>
             </a:r>
             <a:r>
               <a:rPr lang="en-US" dirty="0">
                 <a:latin typeface="Consolas" panose="020B0609020204030204" pitchFamily="49" charset="0"/>
               </a:rPr>
-              <a:t>(</a:t>
+              <a:t>()</a:t>
+            </a:r>
+          </a:p>
+          <a:p>
+            <a:pPr marL="914400" lvl="2" indent="0">
+              <a:spcBef>
+                <a:spcPts val="300"/>
+              </a:spcBef>
+              <a:buNone/>
+            </a:pPr>
+            <a:r>
+              <a:rPr lang="en-US" dirty="0">
+                <a:latin typeface="Consolas" panose="020B0609020204030204" pitchFamily="49" charset="0"/>
+              </a:rPr>
+              <a:t>public void add(Token </a:t>
             </a:r>
             <a:r>
               <a:rPr lang="en-US" dirty="0" err="1">
                 <a:latin typeface="Consolas" panose="020B0609020204030204" pitchFamily="49" charset="0"/>
               </a:rPr>
-              <a:t>ScopeLevel</a:t>
+              <a:t>idToken</a:t>
             </a:r>
             <a:r>
               <a:rPr lang="en-US" dirty="0">
                 <a:latin typeface="Consolas" panose="020B0609020204030204" pitchFamily="49" charset="0"/>
               </a:rPr>
-              <a:t> </a:t>
+              <a:t>, IdType </a:t>
             </a:r>
             <a:r>
               <a:rPr lang="en-US" dirty="0" err="1">
                 <a:latin typeface="Consolas" panose="020B0609020204030204" pitchFamily="49" charset="0"/>
               </a:rPr>
-              <a:t>scopeLevel</a:t>
+              <a:t>idType</a:t>
             </a:r>
             <a:r>
               <a:rPr lang="en-US" dirty="0">
                 <a:latin typeface="Consolas" panose="020B0609020204030204" pitchFamily="49" charset="0"/>
               </a:rPr>
               <a:t>)</a:t>
-            </a:r>
-          </a:p>
-          <a:p>
-            <a:pPr marL="914400" lvl="2" indent="0">
-              <a:spcBef>
-                <a:spcPts val="300"/>
-              </a:spcBef>
-              <a:buNone/>
-            </a:pPr>
-            <a:r>
-              <a:rPr lang="en-US" dirty="0">
-                <a:latin typeface="Consolas" panose="020B0609020204030204" pitchFamily="49" charset="0"/>
-              </a:rPr>
-              <a:t>public void </a:t>
-            </a:r>
-            <a:r>
-              <a:rPr lang="en-US" dirty="0" err="1">
-                <a:latin typeface="Consolas" panose="020B0609020204030204" pitchFamily="49" charset="0"/>
-              </a:rPr>
-              <a:t>closeScope</a:t>
-            </a:r>
-            <a:r>
-              <a:rPr lang="en-US" dirty="0">
-                <a:latin typeface="Consolas" panose="020B0609020204030204" pitchFamily="49" charset="0"/>
-              </a:rPr>
-              <a:t>()</a:t>
-            </a:r>
-          </a:p>
-          <a:p>
-            <a:pPr marL="914400" lvl="2" indent="0">
-              <a:spcBef>
-                <a:spcPts val="300"/>
-              </a:spcBef>
-              <a:buNone/>
-            </a:pPr>
-            <a:r>
-              <a:rPr lang="en-US" dirty="0">
-                <a:latin typeface="Consolas" panose="020B0609020204030204" pitchFamily="49" charset="0"/>
-              </a:rPr>
-              <a:t>public void add(Token </a:t>
-            </a:r>
-            <a:r>
-              <a:rPr lang="en-US" dirty="0" err="1">
-                <a:latin typeface="Consolas" panose="020B0609020204030204" pitchFamily="49" charset="0"/>
-              </a:rPr>
-              <a:t>idToken</a:t>
-            </a:r>
-            <a:r>
-              <a:rPr lang="en-US" dirty="0">
-                <a:latin typeface="Consolas" panose="020B0609020204030204" pitchFamily="49" charset="0"/>
-              </a:rPr>
-              <a:t>, IdType idType)</a:t>
             </a:r>
             <a:br>
               <a:rPr lang="en-US" dirty="0">
@@ -27851,7 +27847,7 @@
               <a:t>Adding Declarations to </a:t>
             </a:r>
             <a:r>
-              <a:rPr lang="en-US" dirty="0" err="1">
+              <a:rPr lang="en-US" dirty="0">
                 <a:latin typeface="Consolas" pitchFamily="49" charset="0"/>
                 <a:cs typeface="Consolas" pitchFamily="49" charset="0"/>
               </a:rPr>
@@ -27881,7 +27877,7 @@
               <a:t>When an identifier is declared, the parser will attempt to add its token and </a:t>
             </a:r>
             <a:r>
-              <a:rPr lang="en-US" dirty="0" err="1">
+              <a:rPr lang="en-US" dirty="0">
                 <a:latin typeface="Consolas" panose="020B0609020204030204" pitchFamily="49" charset="0"/>
               </a:rPr>
               <a:t>IdType</a:t>
@@ -27897,6 +27893,13 @@
               <a:rPr lang="en-US" dirty="0"/>
               <a:t>throws an exception if an identifier with the same name (same token text) has been previously declared in the current scope.</a:t>
             </a:r>
+          </a:p>
+          <a:p>
+            <a:endParaRPr lang="en-US" dirty="0"/>
+          </a:p>
+          <a:p>
+            <a:pPr lvl="1"/>
+            <a:endParaRPr lang="en-US" dirty="0"/>
           </a:p>
           <a:p>
             <a:r>
@@ -27935,7 +27938,7 @@
         </p:nvSpPr>
         <p:spPr bwMode="auto">
           <a:xfrm>
-            <a:off x="2133600" y="3886200"/>
+            <a:off x="2133600" y="4759625"/>
             <a:ext cx="152400" cy="152400"/>
           </a:xfrm>
           <a:prstGeom prst="diamond">
@@ -28000,8 +28003,8 @@
         </p:nvCxnSpPr>
         <p:spPr bwMode="auto">
           <a:xfrm rot="10800000">
-            <a:off x="2209800" y="4038600"/>
-            <a:ext cx="531410" cy="812632"/>
+            <a:off x="2209800" y="4912026"/>
+            <a:ext cx="531410" cy="727167"/>
           </a:xfrm>
           <a:prstGeom prst="bentConnector2">
             <a:avLst/>
@@ -28027,7 +28030,7 @@
         </p:nvSpPr>
         <p:spPr>
           <a:xfrm>
-            <a:off x="2741210" y="4343400"/>
+            <a:off x="2741210" y="5131360"/>
             <a:ext cx="3661580" cy="1015663"/>
           </a:xfrm>
           <a:prstGeom prst="rect">
@@ -28074,6 +28077,65 @@
             <a:r>
               <a:rPr lang="en-US" sz="2000" dirty="0"/>
               <a:t>in the current scope</a:t>
+            </a:r>
+          </a:p>
+        </p:txBody>
+      </p:sp>
+      <p:sp>
+        <p:nvSpPr>
+          <p:cNvPr id="2" name="TextBox 1">
+            <a:extLst>
+              <a:ext uri="{FF2B5EF4-FFF2-40B4-BE49-F238E27FC236}">
+                <a16:creationId xmlns:a16="http://schemas.microsoft.com/office/drawing/2014/main" id="{09BEBF4C-A3A7-8DD2-5040-1277F9B7FCA0}"/>
+              </a:ext>
+            </a:extLst>
+          </p:cNvPr>
+          <p:cNvSpPr txBox="1"/>
+          <p:nvPr/>
+        </p:nvSpPr>
+        <p:spPr>
+          <a:xfrm>
+            <a:off x="1538574" y="3345359"/>
+            <a:ext cx="6066854" cy="769441"/>
+          </a:xfrm>
+          <a:prstGeom prst="rect">
+            <a:avLst/>
+          </a:prstGeom>
+          <a:noFill/>
+          <a:ln>
+            <a:solidFill>
+              <a:schemeClr val="tx1"/>
+            </a:solidFill>
+          </a:ln>
+        </p:spPr>
+        <p:txBody>
+          <a:bodyPr wrap="none" rtlCol="0">
+            <a:spAutoFit/>
+          </a:bodyPr>
+          <a:lstStyle/>
+          <a:p>
+            <a:r>
+              <a:rPr lang="en-US" sz="2200" b="1" dirty="0">
+                <a:solidFill>
+                  <a:srgbClr val="C00000"/>
+                </a:solidFill>
+              </a:rPr>
+              <a:t>Important: Add entries to the identifier table</a:t>
+            </a:r>
+            <a:br>
+              <a:rPr lang="en-US" sz="2200" b="1" dirty="0">
+                <a:solidFill>
+                  <a:srgbClr val="C00000"/>
+                </a:solidFill>
+              </a:rPr>
+            </a:br>
+            <a:r>
+              <a:rPr lang="en-US" sz="2200" b="1" dirty="0">
+                <a:solidFill>
+                  <a:srgbClr val="C00000"/>
+                </a:solidFill>
+              </a:rPr>
+              <a:t>                 only when parsing declarations.</a:t>
             </a:r>
           </a:p>
         </p:txBody>
@@ -28123,7 +28185,7 @@
               <a:t>Using </a:t>
             </a:r>
             <a:r>
-              <a:rPr lang="en-US" dirty="0" err="1">
+              <a:rPr lang="en-US" dirty="0">
                 <a:latin typeface="Consolas" panose="020B0609020204030204" pitchFamily="49" charset="0"/>
               </a:rPr>
               <a:t>IdTable</a:t>
@@ -28529,7 +28591,31 @@
               <a:rPr lang="en-US" sz="1800" b="1" dirty="0">
                 <a:latin typeface="Consolas" panose="020B0609020204030204" pitchFamily="49" charset="0"/>
               </a:rPr>
-              <a:t>    var idType = idTable.get(</a:t>
+              <a:t>    var </a:t>
+            </a:r>
+            <a:r>
+              <a:rPr lang="en-US" sz="1800" b="1" dirty="0" err="1">
+                <a:latin typeface="Consolas" panose="020B0609020204030204" pitchFamily="49" charset="0"/>
+              </a:rPr>
+              <a:t>idType</a:t>
+            </a:r>
+            <a:r>
+              <a:rPr lang="en-US" sz="1800" b="1" dirty="0">
+                <a:latin typeface="Consolas" panose="020B0609020204030204" pitchFamily="49" charset="0"/>
+              </a:rPr>
+              <a:t> = </a:t>
+            </a:r>
+            <a:r>
+              <a:rPr lang="en-US" sz="1800" b="1" dirty="0" err="1">
+                <a:latin typeface="Consolas" panose="020B0609020204030204" pitchFamily="49" charset="0"/>
+              </a:rPr>
+              <a:t>idTable.get</a:t>
+            </a:r>
+            <a:r>
+              <a:rPr lang="en-US" sz="1800" b="1" dirty="0">
+                <a:latin typeface="Consolas" panose="020B0609020204030204" pitchFamily="49" charset="0"/>
+              </a:rPr>
+              <a:t>(</a:t>
             </a:r>
             <a:r>
               <a:rPr lang="en-US" sz="1800" b="1" dirty="0" err="1">
@@ -28566,7 +28652,19 @@
               <a:rPr lang="en-US" sz="1800" b="1" dirty="0">
                 <a:latin typeface="Consolas" panose="020B0609020204030204" pitchFamily="49" charset="0"/>
               </a:rPr>
-              <a:t>    if (idType != null)</a:t>
+              <a:t>    if (</a:t>
+            </a:r>
+            <a:r>
+              <a:rPr lang="en-US" sz="1800" b="1" dirty="0" err="1">
+                <a:latin typeface="Consolas" panose="020B0609020204030204" pitchFamily="49" charset="0"/>
+              </a:rPr>
+              <a:t>idType</a:t>
+            </a:r>
+            <a:r>
+              <a:rPr lang="en-US" sz="1800" b="1" dirty="0">
+                <a:latin typeface="Consolas" panose="020B0609020204030204" pitchFamily="49" charset="0"/>
+              </a:rPr>
+              <a:t> != null)</a:t>
             </a:r>
           </a:p>
           <a:p>
@@ -28594,7 +28692,31 @@
               <a:rPr lang="en-US" sz="1800" b="1" dirty="0">
                 <a:latin typeface="Consolas" panose="020B0609020204030204" pitchFamily="49" charset="0"/>
               </a:rPr>
-              <a:t>        if (idType == IdType.constantId)</a:t>
+              <a:t>        if (</a:t>
+            </a:r>
+            <a:r>
+              <a:rPr lang="en-US" sz="1800" b="1" dirty="0" err="1">
+                <a:latin typeface="Consolas" panose="020B0609020204030204" pitchFamily="49" charset="0"/>
+              </a:rPr>
+              <a:t>idType</a:t>
+            </a:r>
+            <a:r>
+              <a:rPr lang="en-US" sz="1800" b="1" dirty="0">
+                <a:latin typeface="Consolas" panose="020B0609020204030204" pitchFamily="49" charset="0"/>
+              </a:rPr>
+              <a:t> == </a:t>
+            </a:r>
+            <a:r>
+              <a:rPr lang="en-US" sz="1800" b="1" dirty="0" err="1">
+                <a:latin typeface="Consolas" panose="020B0609020204030204" pitchFamily="49" charset="0"/>
+              </a:rPr>
+              <a:t>IdType.constantId</a:t>
+            </a:r>
+            <a:r>
+              <a:rPr lang="en-US" sz="1800" b="1" dirty="0">
+                <a:latin typeface="Consolas" panose="020B0609020204030204" pitchFamily="49" charset="0"/>
+              </a:rPr>
+              <a:t>)</a:t>
             </a:r>
           </a:p>
           <a:p>
@@ -28634,7 +28756,31 @@
               <a:rPr lang="en-US" sz="1800" b="1" dirty="0">
                 <a:latin typeface="Consolas" panose="020B0609020204030204" pitchFamily="49" charset="0"/>
               </a:rPr>
-              <a:t>        else if (idType == IdType.variableId)</a:t>
+              <a:t>        else if (</a:t>
+            </a:r>
+            <a:r>
+              <a:rPr lang="en-US" sz="1800" b="1" dirty="0" err="1">
+                <a:latin typeface="Consolas" panose="020B0609020204030204" pitchFamily="49" charset="0"/>
+              </a:rPr>
+              <a:t>idType</a:t>
+            </a:r>
+            <a:r>
+              <a:rPr lang="en-US" sz="1800" b="1" dirty="0">
+                <a:latin typeface="Consolas" panose="020B0609020204030204" pitchFamily="49" charset="0"/>
+              </a:rPr>
+              <a:t> == </a:t>
+            </a:r>
+            <a:r>
+              <a:rPr lang="en-US" sz="1800" b="1" dirty="0" err="1">
+                <a:latin typeface="Consolas" panose="020B0609020204030204" pitchFamily="49" charset="0"/>
+              </a:rPr>
+              <a:t>IdType.variableId</a:t>
+            </a:r>
+            <a:r>
+              <a:rPr lang="en-US" sz="1800" b="1" dirty="0">
+                <a:latin typeface="Consolas" panose="020B0609020204030204" pitchFamily="49" charset="0"/>
+              </a:rPr>
+              <a:t>)</a:t>
             </a:r>
           </a:p>
           <a:p>
@@ -29332,11 +29478,18 @@
               <a:buNone/>
             </a:pPr>
             <a:r>
-              <a:rPr lang="en-US" sz="1800" dirty="0">
+              <a:rPr lang="en-US" sz="1800" dirty="0" err="1">
                 <a:latin typeface="Consolas" pitchFamily="49" charset="0"/>
                 <a:cs typeface="Consolas" pitchFamily="49" charset="0"/>
               </a:rPr>
-              <a:t>idTable.add(</a:t>
+              <a:t>idTable.add</a:t>
+            </a:r>
+            <a:r>
+              <a:rPr lang="en-US" sz="1800" dirty="0">
+                <a:latin typeface="Consolas" pitchFamily="49" charset="0"/>
+                <a:cs typeface="Consolas" pitchFamily="49" charset="0"/>
+              </a:rPr>
+              <a:t>(</a:t>
             </a:r>
             <a:r>
               <a:rPr lang="en-US" sz="1800" dirty="0" err="1">
@@ -29350,7 +29503,21 @@
                 <a:latin typeface="Consolas" pitchFamily="49" charset="0"/>
                 <a:cs typeface="Consolas" pitchFamily="49" charset="0"/>
               </a:rPr>
-              <a:t>, IdType.procedureId);</a:t>
+              <a:t>, </a:t>
+            </a:r>
+            <a:r>
+              <a:rPr lang="en-US" sz="1800" dirty="0" err="1">
+                <a:latin typeface="Consolas" pitchFamily="49" charset="0"/>
+                <a:cs typeface="Consolas" pitchFamily="49" charset="0"/>
+              </a:rPr>
+              <a:t>IdType.procedureId</a:t>
+            </a:r>
+            <a:r>
+              <a:rPr lang="en-US" sz="1800" dirty="0">
+                <a:latin typeface="Consolas" pitchFamily="49" charset="0"/>
+                <a:cs typeface="Consolas" pitchFamily="49" charset="0"/>
+              </a:rPr>
+              <a:t>);</a:t>
             </a:r>
           </a:p>
           <a:p>
@@ -29422,7 +29589,21 @@
                 <a:latin typeface="Consolas" pitchFamily="49" charset="0"/>
                 <a:cs typeface="Consolas" pitchFamily="49" charset="0"/>
               </a:rPr>
-              <a:t>    idTable.openScope(</a:t>
+              <a:t>    </a:t>
+            </a:r>
+            <a:r>
+              <a:rPr lang="en-US" sz="1800" dirty="0" err="1">
+                <a:latin typeface="Consolas" pitchFamily="49" charset="0"/>
+                <a:cs typeface="Consolas" pitchFamily="49" charset="0"/>
+              </a:rPr>
+              <a:t>idTable.openScope</a:t>
+            </a:r>
+            <a:r>
+              <a:rPr lang="en-US" sz="1800" dirty="0">
+                <a:latin typeface="Consolas" pitchFamily="49" charset="0"/>
+                <a:cs typeface="Consolas" pitchFamily="49" charset="0"/>
+              </a:rPr>
+              <a:t>(</a:t>
             </a:r>
             <a:r>
               <a:rPr lang="en-US" sz="1800" dirty="0" err="1">
@@ -30402,7 +30583,19 @@
               <a:rPr lang="en-US" sz="1800" dirty="0">
                 <a:latin typeface="Consolas" pitchFamily="49" charset="0"/>
               </a:rPr>
-              <a:t>    idTable.closeScope();</a:t>
+              <a:t>    </a:t>
+            </a:r>
+            <a:r>
+              <a:rPr lang="en-US" sz="1800" dirty="0" err="1">
+                <a:latin typeface="Consolas" pitchFamily="49" charset="0"/>
+              </a:rPr>
+              <a:t>idTable.closeScope</a:t>
+            </a:r>
+            <a:r>
+              <a:rPr lang="en-US" sz="1800" dirty="0">
+                <a:latin typeface="Consolas" pitchFamily="49" charset="0"/>
+              </a:rPr>
+              <a:t>();</a:t>
             </a:r>
           </a:p>
           <a:p>
@@ -30741,13 +30934,41 @@
                 <a:latin typeface="Consolas" pitchFamily="49" charset="0"/>
                 <a:cs typeface="Consolas" pitchFamily="49" charset="0"/>
               </a:rPr>
-              <a:t>    var idType = idTable.get(</a:t>
+              <a:t>    var </a:t>
             </a:r>
             <a:r>
               <a:rPr lang="en-US" sz="1800" b="1" dirty="0" err="1">
                 <a:latin typeface="Consolas" pitchFamily="49" charset="0"/>
                 <a:cs typeface="Consolas" pitchFamily="49" charset="0"/>
               </a:rPr>
+              <a:t>idType</a:t>
+            </a:r>
+            <a:r>
+              <a:rPr lang="en-US" sz="1800" b="1" dirty="0">
+                <a:latin typeface="Consolas" pitchFamily="49" charset="0"/>
+                <a:cs typeface="Consolas" pitchFamily="49" charset="0"/>
+              </a:rPr>
+              <a:t> = </a:t>
+            </a:r>
+            <a:r>
+              <a:rPr lang="en-US" sz="1800" b="1" dirty="0" err="1">
+                <a:latin typeface="Consolas" pitchFamily="49" charset="0"/>
+                <a:cs typeface="Consolas" pitchFamily="49" charset="0"/>
+              </a:rPr>
+              <a:t>idTable.get</a:t>
+            </a:r>
+            <a:r>
+              <a:rPr lang="en-US" sz="1800" b="1" dirty="0">
+                <a:latin typeface="Consolas" pitchFamily="49" charset="0"/>
+                <a:cs typeface="Consolas" pitchFamily="49" charset="0"/>
+              </a:rPr>
+              <a:t>(</a:t>
+            </a:r>
+            <a:r>
+              <a:rPr lang="en-US" sz="1800" b="1" dirty="0" err="1">
+                <a:latin typeface="Consolas" pitchFamily="49" charset="0"/>
+                <a:cs typeface="Consolas" pitchFamily="49" charset="0"/>
+              </a:rPr>
               <a:t>idStr</a:t>
             </a:r>
             <a:r>
@@ -30770,7 +30991,21 @@
                 <a:latin typeface="Consolas" pitchFamily="49" charset="0"/>
                 <a:cs typeface="Consolas" pitchFamily="49" charset="0"/>
               </a:rPr>
-              <a:t>    if (idType != null)</a:t>
+              <a:t>    if (</a:t>
+            </a:r>
+            <a:r>
+              <a:rPr lang="en-US" sz="1800" b="1" dirty="0" err="1">
+                <a:latin typeface="Consolas" pitchFamily="49" charset="0"/>
+                <a:cs typeface="Consolas" pitchFamily="49" charset="0"/>
+              </a:rPr>
+              <a:t>idType</a:t>
+            </a:r>
+            <a:r>
+              <a:rPr lang="en-US" sz="1800" b="1" dirty="0">
+                <a:latin typeface="Consolas" pitchFamily="49" charset="0"/>
+                <a:cs typeface="Consolas" pitchFamily="49" charset="0"/>
+              </a:rPr>
+              <a:t> != null)</a:t>
             </a:r>
           </a:p>
           <a:p>
@@ -30800,7 +31035,35 @@
                 <a:latin typeface="Consolas" pitchFamily="49" charset="0"/>
                 <a:cs typeface="Consolas" pitchFamily="49" charset="0"/>
               </a:rPr>
-              <a:t>        if (idType == IdType.variableId)</a:t>
+              <a:t>        if (</a:t>
+            </a:r>
+            <a:r>
+              <a:rPr lang="en-US" sz="1800" b="1" dirty="0" err="1">
+                <a:latin typeface="Consolas" pitchFamily="49" charset="0"/>
+                <a:cs typeface="Consolas" pitchFamily="49" charset="0"/>
+              </a:rPr>
+              <a:t>idType</a:t>
+            </a:r>
+            <a:r>
+              <a:rPr lang="en-US" sz="1800" b="1" dirty="0">
+                <a:latin typeface="Consolas" pitchFamily="49" charset="0"/>
+                <a:cs typeface="Consolas" pitchFamily="49" charset="0"/>
+              </a:rPr>
+              <a:t> == </a:t>
+            </a:r>
+            <a:r>
+              <a:rPr lang="en-US" sz="1800" b="1" dirty="0" err="1">
+                <a:latin typeface="Consolas" pitchFamily="49" charset="0"/>
+                <a:cs typeface="Consolas" pitchFamily="49" charset="0"/>
+              </a:rPr>
+              <a:t>IdType.variableId</a:t>
+            </a:r>
+            <a:r>
+              <a:rPr lang="en-US" sz="1800" b="1" dirty="0">
+                <a:latin typeface="Consolas" pitchFamily="49" charset="0"/>
+                <a:cs typeface="Consolas" pitchFamily="49" charset="0"/>
+              </a:rPr>
+              <a:t>)</a:t>
             </a:r>
           </a:p>
           <a:p>
@@ -30830,7 +31093,35 @@
                 <a:latin typeface="Consolas" pitchFamily="49" charset="0"/>
                 <a:cs typeface="Consolas" pitchFamily="49" charset="0"/>
               </a:rPr>
-              <a:t>        else if (idType == IdType.procedureId)</a:t>
+              <a:t>        else if (</a:t>
+            </a:r>
+            <a:r>
+              <a:rPr lang="en-US" sz="1800" b="1" dirty="0" err="1">
+                <a:latin typeface="Consolas" pitchFamily="49" charset="0"/>
+                <a:cs typeface="Consolas" pitchFamily="49" charset="0"/>
+              </a:rPr>
+              <a:t>idType</a:t>
+            </a:r>
+            <a:r>
+              <a:rPr lang="en-US" sz="1800" b="1" dirty="0">
+                <a:latin typeface="Consolas" pitchFamily="49" charset="0"/>
+                <a:cs typeface="Consolas" pitchFamily="49" charset="0"/>
+              </a:rPr>
+              <a:t> == </a:t>
+            </a:r>
+            <a:r>
+              <a:rPr lang="en-US" sz="1800" b="1" dirty="0" err="1">
+                <a:latin typeface="Consolas" pitchFamily="49" charset="0"/>
+                <a:cs typeface="Consolas" pitchFamily="49" charset="0"/>
+              </a:rPr>
+              <a:t>IdType.procedureId</a:t>
+            </a:r>
+            <a:r>
+              <a:rPr lang="en-US" sz="1800" b="1" dirty="0">
+                <a:latin typeface="Consolas" pitchFamily="49" charset="0"/>
+                <a:cs typeface="Consolas" pitchFamily="49" charset="0"/>
+              </a:rPr>
+              <a:t>)</a:t>
             </a:r>
           </a:p>
           <a:p>
@@ -33199,7 +33490,31 @@
               <a:rPr lang="en-US" sz="1800" dirty="0">
                 <a:latin typeface="Consolas" panose="020B0609020204030204" pitchFamily="49" charset="0"/>
               </a:rPr>
-              <a:t>    var idType = idTable.get(</a:t>
+              <a:t>    var </a:t>
+            </a:r>
+            <a:r>
+              <a:rPr lang="en-US" sz="1800" dirty="0" err="1">
+                <a:latin typeface="Consolas" panose="020B0609020204030204" pitchFamily="49" charset="0"/>
+              </a:rPr>
+              <a:t>idType</a:t>
+            </a:r>
+            <a:r>
+              <a:rPr lang="en-US" sz="1800" dirty="0">
+                <a:latin typeface="Consolas" panose="020B0609020204030204" pitchFamily="49" charset="0"/>
+              </a:rPr>
+              <a:t> = </a:t>
+            </a:r>
+            <a:r>
+              <a:rPr lang="en-US" sz="1800" dirty="0" err="1">
+                <a:latin typeface="Consolas" panose="020B0609020204030204" pitchFamily="49" charset="0"/>
+              </a:rPr>
+              <a:t>idTable.get</a:t>
+            </a:r>
+            <a:r>
+              <a:rPr lang="en-US" sz="1800" dirty="0">
+                <a:latin typeface="Consolas" panose="020B0609020204030204" pitchFamily="49" charset="0"/>
+              </a:rPr>
+              <a:t>(</a:t>
             </a:r>
             <a:r>
               <a:rPr lang="en-US" sz="1800" dirty="0" err="1">
@@ -33236,7 +33551,19 @@
               <a:rPr lang="en-US" sz="1800" dirty="0">
                 <a:latin typeface="Consolas" panose="020B0609020204030204" pitchFamily="49" charset="0"/>
               </a:rPr>
-              <a:t>    if (idType == null)</a:t>
+              <a:t>    if (</a:t>
+            </a:r>
+            <a:r>
+              <a:rPr lang="en-US" sz="1800" dirty="0" err="1">
+                <a:latin typeface="Consolas" panose="020B0609020204030204" pitchFamily="49" charset="0"/>
+              </a:rPr>
+              <a:t>idType</a:t>
+            </a:r>
+            <a:r>
+              <a:rPr lang="en-US" sz="1800" dirty="0">
+                <a:latin typeface="Consolas" panose="020B0609020204030204" pitchFamily="49" charset="0"/>
+              </a:rPr>
+              <a:t> == null)</a:t>
             </a:r>
           </a:p>
           <a:p>
@@ -33365,7 +33692,31 @@
               <a:rPr lang="en-US" sz="1800" dirty="0">
                 <a:latin typeface="Consolas" panose="020B0609020204030204" pitchFamily="49" charset="0"/>
               </a:rPr>
-              <a:t>    else if (idType != IdType.variableId)</a:t>
+              <a:t>    else if (</a:t>
+            </a:r>
+            <a:r>
+              <a:rPr lang="en-US" sz="1800" dirty="0" err="1">
+                <a:latin typeface="Consolas" panose="020B0609020204030204" pitchFamily="49" charset="0"/>
+              </a:rPr>
+              <a:t>idType</a:t>
+            </a:r>
+            <a:r>
+              <a:rPr lang="en-US" sz="1800" dirty="0">
+                <a:latin typeface="Consolas" panose="020B0609020204030204" pitchFamily="49" charset="0"/>
+              </a:rPr>
+              <a:t> != </a:t>
+            </a:r>
+            <a:r>
+              <a:rPr lang="en-US" sz="1800" dirty="0" err="1">
+                <a:latin typeface="Consolas" panose="020B0609020204030204" pitchFamily="49" charset="0"/>
+              </a:rPr>
+              <a:t>IdType.variableId</a:t>
+            </a:r>
+            <a:r>
+              <a:rPr lang="en-US" sz="1800" dirty="0">
+                <a:latin typeface="Consolas" panose="020B0609020204030204" pitchFamily="49" charset="0"/>
+              </a:rPr>
+              <a:t>)</a:t>
             </a:r>
           </a:p>
           <a:p>
@@ -34731,19 +35082,7 @@
               <a:rPr lang="en-US" sz="1800" dirty="0">
                 <a:latin typeface="Consolas" panose="020B0609020204030204" pitchFamily="49" charset="0"/>
               </a:rPr>
-              <a:t>, </a:t>
-            </a:r>
-            <a:r>
-              <a:rPr lang="en-US" sz="1800" dirty="0" err="1">
-                <a:latin typeface="Consolas" panose="020B0609020204030204" pitchFamily="49" charset="0"/>
-              </a:rPr>
-              <a:t>IdTable</a:t>
-            </a:r>
-            <a:r>
-              <a:rPr lang="en-US" sz="1800" dirty="0">
-                <a:latin typeface="Consolas" panose="020B0609020204030204" pitchFamily="49" charset="0"/>
-              </a:rPr>
-              <a:t> </a:t>
+              <a:t>, IdTable </a:t>
             </a:r>
             <a:r>
               <a:rPr lang="en-US" sz="1800" dirty="0" err="1">
@@ -35270,19 +35609,7 @@
               <a:rPr lang="en-US" sz="1800" dirty="0">
                 <a:latin typeface="Consolas" panose="020B0609020204030204" pitchFamily="49" charset="0"/>
               </a:rPr>
-              <a:t> = new </a:t>
-            </a:r>
-            <a:r>
-              <a:rPr lang="en-US" sz="1800" dirty="0" err="1">
-                <a:latin typeface="Consolas" panose="020B0609020204030204" pitchFamily="49" charset="0"/>
-              </a:rPr>
-              <a:t>IdTable</a:t>
-            </a:r>
-            <a:r>
-              <a:rPr lang="en-US" sz="1800" dirty="0">
-                <a:latin typeface="Consolas" panose="020B0609020204030204" pitchFamily="49" charset="0"/>
-              </a:rPr>
-              <a:t>();</a:t>
+              <a:t> = new IdTable();</a:t>
             </a:r>
           </a:p>
           <a:p>

</xml_diff>